<commit_message>
code prompt exe files added.
</commit_message>
<xml_diff>
--- a/ppt/golang/interview_questions/4/datatypes.pptx
+++ b/ppt/golang/interview_questions/4/datatypes.pptx
@@ -239,7 +239,7 @@
           <a:p>
             <a:fld id="{BCE0E4AC-8269-43F5-ACB7-AD1D79973620}" type="datetimeFigureOut">
               <a:rPr lang="en-US" smtClean="0"/>
-              <a:t>4/8/2025</a:t>
+              <a:t>4/29/2025</a:t>
             </a:fld>
             <a:endParaRPr lang="en-US"/>
           </a:p>
@@ -1904,7 +1904,7 @@
           <a:p>
             <a:fld id="{5BCAD085-E8A6-8845-BD4E-CB4CCA059FC4}" type="datetimeFigureOut">
               <a:rPr lang="en-US" smtClean="0"/>
-              <a:t>4/8/2025</a:t>
+              <a:t>4/29/2025</a:t>
             </a:fld>
             <a:endParaRPr lang="en-US"/>
           </a:p>
@@ -2228,7 +2228,7 @@
           <a:p>
             <a:fld id="{5BCAD085-E8A6-8845-BD4E-CB4CCA059FC4}" type="datetimeFigureOut">
               <a:rPr lang="en-US" smtClean="0"/>
-              <a:t>4/8/2025</a:t>
+              <a:t>4/29/2025</a:t>
             </a:fld>
             <a:endParaRPr lang="en-US"/>
           </a:p>
@@ -2476,7 +2476,7 @@
           <a:p>
             <a:fld id="{5BCAD085-E8A6-8845-BD4E-CB4CCA059FC4}" type="datetimeFigureOut">
               <a:rPr lang="en-US" smtClean="0"/>
-              <a:t>4/8/2025</a:t>
+              <a:t>4/29/2025</a:t>
             </a:fld>
             <a:endParaRPr lang="en-US"/>
           </a:p>
@@ -2815,7 +2815,7 @@
           <a:p>
             <a:fld id="{5BCAD085-E8A6-8845-BD4E-CB4CCA059FC4}" type="datetimeFigureOut">
               <a:rPr lang="en-US" smtClean="0"/>
-              <a:t>4/8/2025</a:t>
+              <a:t>4/29/2025</a:t>
             </a:fld>
             <a:endParaRPr lang="en-US"/>
           </a:p>
@@ -3162,7 +3162,7 @@
           <a:p>
             <a:fld id="{5BCAD085-E8A6-8845-BD4E-CB4CCA059FC4}" type="datetimeFigureOut">
               <a:rPr lang="en-US" smtClean="0"/>
-              <a:t>4/8/2025</a:t>
+              <a:t>4/29/2025</a:t>
             </a:fld>
             <a:endParaRPr lang="en-US"/>
           </a:p>
@@ -3536,7 +3536,7 @@
           <a:p>
             <a:fld id="{5BCAD085-E8A6-8845-BD4E-CB4CCA059FC4}" type="datetimeFigureOut">
               <a:rPr lang="en-US" smtClean="0"/>
-              <a:t>4/8/2025</a:t>
+              <a:t>4/29/2025</a:t>
             </a:fld>
             <a:endParaRPr lang="en-US"/>
           </a:p>
@@ -4006,7 +4006,7 @@
           <a:p>
             <a:fld id="{5BCAD085-E8A6-8845-BD4E-CB4CCA059FC4}" type="datetimeFigureOut">
               <a:rPr lang="en-US" smtClean="0"/>
-              <a:t>4/8/2025</a:t>
+              <a:t>4/29/2025</a:t>
             </a:fld>
             <a:endParaRPr lang="en-US"/>
           </a:p>
@@ -4211,7 +4211,7 @@
           <a:p>
             <a:fld id="{5BCAD085-E8A6-8845-BD4E-CB4CCA059FC4}" type="datetimeFigureOut">
               <a:rPr lang="en-US" smtClean="0"/>
-              <a:t>4/8/2025</a:t>
+              <a:t>4/29/2025</a:t>
             </a:fld>
             <a:endParaRPr lang="en-US"/>
           </a:p>
@@ -4422,7 +4422,7 @@
           <a:p>
             <a:fld id="{5BCAD085-E8A6-8845-BD4E-CB4CCA059FC4}" type="datetimeFigureOut">
               <a:rPr lang="en-US" smtClean="0"/>
-              <a:t>4/8/2025</a:t>
+              <a:t>4/29/2025</a:t>
             </a:fld>
             <a:endParaRPr lang="en-US"/>
           </a:p>
@@ -4654,7 +4654,7 @@
           <a:p>
             <a:fld id="{5BCAD085-E8A6-8845-BD4E-CB4CCA059FC4}" type="datetimeFigureOut">
               <a:rPr lang="en-US" smtClean="0"/>
-              <a:t>4/8/2025</a:t>
+              <a:t>4/29/2025</a:t>
             </a:fld>
             <a:endParaRPr lang="en-US"/>
           </a:p>
@@ -4902,7 +4902,7 @@
           <a:p>
             <a:fld id="{5BCAD085-E8A6-8845-BD4E-CB4CCA059FC4}" type="datetimeFigureOut">
               <a:rPr lang="en-US" smtClean="0"/>
-              <a:t>4/8/2025</a:t>
+              <a:t>4/29/2025</a:t>
             </a:fld>
             <a:endParaRPr lang="en-US"/>
           </a:p>
@@ -5200,7 +5200,7 @@
           <a:p>
             <a:fld id="{5BCAD085-E8A6-8845-BD4E-CB4CCA059FC4}" type="datetimeFigureOut">
               <a:rPr lang="en-US" smtClean="0"/>
-              <a:t>4/8/2025</a:t>
+              <a:t>4/29/2025</a:t>
             </a:fld>
             <a:endParaRPr lang="en-US"/>
           </a:p>
@@ -5594,7 +5594,7 @@
           <a:p>
             <a:fld id="{5BCAD085-E8A6-8845-BD4E-CB4CCA059FC4}" type="datetimeFigureOut">
               <a:rPr lang="en-US" smtClean="0"/>
-              <a:t>4/8/2025</a:t>
+              <a:t>4/29/2025</a:t>
             </a:fld>
             <a:endParaRPr lang="en-US"/>
           </a:p>
@@ -5743,7 +5743,7 @@
           <a:p>
             <a:fld id="{5BCAD085-E8A6-8845-BD4E-CB4CCA059FC4}" type="datetimeFigureOut">
               <a:rPr lang="en-US" smtClean="0"/>
-              <a:t>4/8/2025</a:t>
+              <a:t>4/29/2025</a:t>
             </a:fld>
             <a:endParaRPr lang="en-US"/>
           </a:p>
@@ -5869,7 +5869,7 @@
           <a:p>
             <a:fld id="{5BCAD085-E8A6-8845-BD4E-CB4CCA059FC4}" type="datetimeFigureOut">
               <a:rPr lang="en-US" smtClean="0"/>
-              <a:t>4/8/2025</a:t>
+              <a:t>4/29/2025</a:t>
             </a:fld>
             <a:endParaRPr lang="en-US"/>
           </a:p>
@@ -6124,7 +6124,7 @@
           <a:p>
             <a:fld id="{5BCAD085-E8A6-8845-BD4E-CB4CCA059FC4}" type="datetimeFigureOut">
               <a:rPr lang="en-US" smtClean="0"/>
-              <a:t>4/8/2025</a:t>
+              <a:t>4/29/2025</a:t>
             </a:fld>
             <a:endParaRPr lang="en-US"/>
           </a:p>
@@ -6439,7 +6439,7 @@
           <a:p>
             <a:fld id="{5BCAD085-E8A6-8845-BD4E-CB4CCA059FC4}" type="datetimeFigureOut">
               <a:rPr lang="en-US" smtClean="0"/>
-              <a:t>4/8/2025</a:t>
+              <a:t>4/29/2025</a:t>
             </a:fld>
             <a:endParaRPr lang="en-US"/>
           </a:p>
@@ -6790,7 +6790,7 @@
           <a:p>
             <a:fld id="{5BCAD085-E8A6-8845-BD4E-CB4CCA059FC4}" type="datetimeFigureOut">
               <a:rPr lang="en-US" smtClean="0"/>
-              <a:t>4/8/2025</a:t>
+              <a:t>4/29/2025</a:t>
             </a:fld>
             <a:endParaRPr lang="en-US"/>
           </a:p>
@@ -9500,7 +9500,7 @@
           <a:bodyPr wrap="square"/>
           <a:lstStyle/>
           <a:p>
-            <a:endParaRPr/>
+            <a:endParaRPr dirty="0"/>
           </a:p>
           <a:p>
             <a:pPr algn="ctr">
@@ -9511,6 +9511,7 @@
               </a:defRPr>
             </a:pPr>
             <a:r>
+              <a:rPr dirty="0"/>
               <a:t>Interfaces in Go:</a:t>
             </a:r>
           </a:p>
@@ -9523,6 +9524,7 @@
               </a:defRPr>
             </a:pPr>
             <a:r>
+              <a:rPr dirty="0"/>
               <a:t>- Specify method sets</a:t>
             </a:r>
           </a:p>
@@ -9535,6 +9537,7 @@
               </a:defRPr>
             </a:pPr>
             <a:r>
+              <a:rPr dirty="0"/>
               <a:t>- A type satisfies an interface implicitly</a:t>
             </a:r>
           </a:p>
@@ -9547,6 +9550,7 @@
               </a:defRPr>
             </a:pPr>
             <a:r>
+              <a:rPr dirty="0"/>
               <a:t>- `interface{}` is the empty interface → can hold any type</a:t>
             </a:r>
           </a:p>
@@ -9754,7 +9758,7 @@
           <a:bodyPr wrap="square"/>
           <a:lstStyle/>
           <a:p>
-            <a:endParaRPr/>
+            <a:endParaRPr dirty="0"/>
           </a:p>
           <a:p>
             <a:pPr algn="ctr">
@@ -9765,6 +9769,7 @@
               </a:defRPr>
             </a:pPr>
             <a:r>
+              <a:rPr dirty="0"/>
               <a:t>Channels in Go:</a:t>
             </a:r>
           </a:p>
@@ -9777,6 +9782,7 @@
               </a:defRPr>
             </a:pPr>
             <a:r>
+              <a:rPr dirty="0"/>
               <a:t>- Used for communication between goroutines</a:t>
             </a:r>
           </a:p>
@@ -9789,7 +9795,32 @@
               </a:defRPr>
             </a:pPr>
             <a:r>
-              <a:t>- Types: `chan T`, `chan&lt;- T`, `&lt;-chan T`</a:t>
+              <a:rPr dirty="0"/>
+              <a:t>- Types: `</a:t>
+            </a:r>
+            <a:r>
+              <a:rPr dirty="0" err="1"/>
+              <a:t>chan</a:t>
+            </a:r>
+            <a:r>
+              <a:rPr dirty="0"/>
+              <a:t> T`, `</a:t>
+            </a:r>
+            <a:r>
+              <a:rPr dirty="0" err="1"/>
+              <a:t>chan</a:t>
+            </a:r>
+            <a:r>
+              <a:rPr dirty="0"/>
+              <a:t>&lt;- T`, `&lt;-</a:t>
+            </a:r>
+            <a:r>
+              <a:rPr dirty="0" err="1"/>
+              <a:t>chan</a:t>
+            </a:r>
+            <a:r>
+              <a:rPr dirty="0"/>
+              <a:t> T`</a:t>
             </a:r>
           </a:p>
           <a:p>
@@ -9801,6 +9832,7 @@
               </a:defRPr>
             </a:pPr>
             <a:r>
+              <a:rPr dirty="0"/>
               <a:t>- Can be buffered or unbuffered</a:t>
             </a:r>
           </a:p>
@@ -9841,12 +9873,18 @@
             <p:ph type="title"/>
           </p:nvPr>
         </p:nvSpPr>
-        <p:spPr/>
+        <p:spPr>
+          <a:xfrm>
+            <a:off x="1074790" y="168787"/>
+            <a:ext cx="7200897" cy="977900"/>
+          </a:xfrm>
+        </p:spPr>
         <p:txBody>
           <a:bodyPr/>
           <a:lstStyle/>
           <a:p>
             <a:r>
+              <a:rPr dirty="0"/>
               <a:t>Channel Type Example</a:t>
             </a:r>
           </a:p>
@@ -9860,8 +9898,8 @@
         </p:nvSpPr>
         <p:spPr>
           <a:xfrm>
-            <a:off x="971552" y="1714500"/>
-            <a:ext cx="7200896" cy="2215991"/>
+            <a:off x="971552" y="903339"/>
+            <a:ext cx="7200896" cy="3785652"/>
           </a:xfrm>
           <a:prstGeom prst="rect">
             <a:avLst/>
@@ -9876,82 +9914,587 @@
           </a:bodyPr>
           <a:lstStyle/>
           <a:p>
-            <a:endParaRPr dirty="0"/>
-          </a:p>
-          <a:p>
-            <a:pPr algn="l">
-              <a:defRPr sz="2400">
+            <a:r>
+              <a:rPr lang="en-US" sz="1200" dirty="0" err="1">
                 <a:solidFill>
                   <a:srgbClr val="FFFFFF"/>
                 </a:solidFill>
                 <a:latin typeface="Courier New"/>
-              </a:defRPr>
-            </a:pPr>
-            <a:r>
-              <a:rPr dirty="0" err="1"/>
+              </a:rPr>
+              <a:t>func</a:t>
+            </a:r>
+            <a:r>
+              <a:rPr lang="en-US" sz="1200" dirty="0">
+                <a:solidFill>
+                  <a:srgbClr val="FFFFFF"/>
+                </a:solidFill>
+                <a:latin typeface="Courier New"/>
+              </a:rPr>
+              <a:t> </a:t>
+            </a:r>
+            <a:r>
+              <a:rPr lang="en-US" sz="1200" dirty="0" err="1">
+                <a:solidFill>
+                  <a:srgbClr val="FFFFFF"/>
+                </a:solidFill>
+                <a:latin typeface="Courier New"/>
+              </a:rPr>
+              <a:t>sendData</a:t>
+            </a:r>
+            <a:r>
+              <a:rPr lang="en-US" sz="1200" dirty="0">
+                <a:solidFill>
+                  <a:srgbClr val="FFFFFF"/>
+                </a:solidFill>
+                <a:latin typeface="Courier New"/>
+              </a:rPr>
+              <a:t>(</a:t>
+            </a:r>
+            <a:r>
+              <a:rPr lang="en-US" sz="1200" dirty="0" err="1">
+                <a:solidFill>
+                  <a:srgbClr val="FFFFFF"/>
+                </a:solidFill>
+                <a:latin typeface="Courier New"/>
+              </a:rPr>
               <a:t>ch</a:t>
             </a:r>
             <a:r>
-              <a:rPr dirty="0"/>
+              <a:rPr lang="en-US" sz="1200" dirty="0">
+                <a:solidFill>
+                  <a:srgbClr val="FFFFFF"/>
+                </a:solidFill>
+                <a:latin typeface="Courier New"/>
+              </a:rPr>
+              <a:t> </a:t>
+            </a:r>
+            <a:r>
+              <a:rPr lang="en-US" sz="1200" dirty="0" err="1">
+                <a:solidFill>
+                  <a:srgbClr val="FFFFFF"/>
+                </a:solidFill>
+                <a:latin typeface="Courier New"/>
+              </a:rPr>
+              <a:t>chan</a:t>
+            </a:r>
+            <a:r>
+              <a:rPr lang="en-US" sz="1200" dirty="0">
+                <a:solidFill>
+                  <a:srgbClr val="FFFFFF"/>
+                </a:solidFill>
+                <a:latin typeface="Courier New"/>
+              </a:rPr>
+              <a:t>&lt;- int) {</a:t>
+            </a:r>
+          </a:p>
+          <a:p>
+            <a:r>
+              <a:rPr lang="en-US" sz="1200" dirty="0">
+                <a:solidFill>
+                  <a:srgbClr val="FFFFFF"/>
+                </a:solidFill>
+                <a:latin typeface="Courier New"/>
+              </a:rPr>
+              <a:t>	// Sending data into the channel, as it is a '</a:t>
+            </a:r>
+            <a:r>
+              <a:rPr lang="en-US" sz="1200" dirty="0" err="1">
+                <a:solidFill>
+                  <a:srgbClr val="FFFFFF"/>
+                </a:solidFill>
+                <a:latin typeface="Courier New"/>
+              </a:rPr>
+              <a:t>chan</a:t>
+            </a:r>
+            <a:r>
+              <a:rPr lang="en-US" sz="1200" dirty="0">
+                <a:solidFill>
+                  <a:srgbClr val="FFFFFF"/>
+                </a:solidFill>
+                <a:latin typeface="Courier New"/>
+              </a:rPr>
+              <a:t>&lt;- int' type.</a:t>
+            </a:r>
+          </a:p>
+          <a:p>
+            <a:r>
+              <a:rPr lang="en-US" sz="1200" dirty="0">
+                <a:solidFill>
+                  <a:srgbClr val="FFFFFF"/>
+                </a:solidFill>
+                <a:latin typeface="Courier New"/>
+              </a:rPr>
+              <a:t>	</a:t>
+            </a:r>
+            <a:r>
+              <a:rPr lang="en-US" sz="1200" dirty="0" err="1">
+                <a:solidFill>
+                  <a:srgbClr val="FFFFFF"/>
+                </a:solidFill>
+                <a:latin typeface="Courier New"/>
+              </a:rPr>
+              <a:t>ch</a:t>
+            </a:r>
+            <a:r>
+              <a:rPr lang="en-US" sz="1200" dirty="0">
+                <a:solidFill>
+                  <a:srgbClr val="FFFFFF"/>
+                </a:solidFill>
+                <a:latin typeface="Courier New"/>
+              </a:rPr>
+              <a:t> &lt;- 42</a:t>
+            </a:r>
+          </a:p>
+          <a:p>
+            <a:r>
+              <a:rPr lang="en-US" sz="1200" dirty="0">
+                <a:solidFill>
+                  <a:srgbClr val="FFFFFF"/>
+                </a:solidFill>
+                <a:latin typeface="Courier New"/>
+              </a:rPr>
+              <a:t>}</a:t>
+            </a:r>
+          </a:p>
+          <a:p>
+            <a:endParaRPr lang="en-US" sz="1200" dirty="0">
+              <a:solidFill>
+                <a:srgbClr val="FFFFFF"/>
+              </a:solidFill>
+              <a:latin typeface="Courier New"/>
+            </a:endParaRPr>
+          </a:p>
+          <a:p>
+            <a:r>
+              <a:rPr lang="en-US" sz="1200" dirty="0" err="1">
+                <a:solidFill>
+                  <a:srgbClr val="FFFFFF"/>
+                </a:solidFill>
+                <a:latin typeface="Courier New"/>
+              </a:rPr>
+              <a:t>func</a:t>
+            </a:r>
+            <a:r>
+              <a:rPr lang="en-US" sz="1200" dirty="0">
+                <a:solidFill>
+                  <a:srgbClr val="FFFFFF"/>
+                </a:solidFill>
+                <a:latin typeface="Courier New"/>
+              </a:rPr>
+              <a:t> </a:t>
+            </a:r>
+            <a:r>
+              <a:rPr lang="en-US" sz="1200" dirty="0" err="1">
+                <a:solidFill>
+                  <a:srgbClr val="FFFFFF"/>
+                </a:solidFill>
+                <a:latin typeface="Courier New"/>
+              </a:rPr>
+              <a:t>receiveData</a:t>
+            </a:r>
+            <a:r>
+              <a:rPr lang="en-US" sz="1200" dirty="0">
+                <a:solidFill>
+                  <a:srgbClr val="FFFFFF"/>
+                </a:solidFill>
+                <a:latin typeface="Courier New"/>
+              </a:rPr>
+              <a:t>(</a:t>
+            </a:r>
+            <a:r>
+              <a:rPr lang="en-US" sz="1200" dirty="0" err="1">
+                <a:solidFill>
+                  <a:srgbClr val="FFFFFF"/>
+                </a:solidFill>
+                <a:latin typeface="Courier New"/>
+              </a:rPr>
+              <a:t>ch</a:t>
+            </a:r>
+            <a:r>
+              <a:rPr lang="en-US" sz="1200" dirty="0">
+                <a:solidFill>
+                  <a:srgbClr val="FFFFFF"/>
+                </a:solidFill>
+                <a:latin typeface="Courier New"/>
+              </a:rPr>
+              <a:t> &lt;-</a:t>
+            </a:r>
+            <a:r>
+              <a:rPr lang="en-US" sz="1200" dirty="0" err="1">
+                <a:solidFill>
+                  <a:srgbClr val="FFFFFF"/>
+                </a:solidFill>
+                <a:latin typeface="Courier New"/>
+              </a:rPr>
+              <a:t>chan</a:t>
+            </a:r>
+            <a:r>
+              <a:rPr lang="en-US" sz="1200" dirty="0">
+                <a:solidFill>
+                  <a:srgbClr val="FFFFFF"/>
+                </a:solidFill>
+                <a:latin typeface="Courier New"/>
+              </a:rPr>
+              <a:t> int) {</a:t>
+            </a:r>
+          </a:p>
+          <a:p>
+            <a:r>
+              <a:rPr lang="en-US" sz="1200" dirty="0">
+                <a:solidFill>
+                  <a:srgbClr val="FFFFFF"/>
+                </a:solidFill>
+                <a:latin typeface="Courier New"/>
+              </a:rPr>
+              <a:t>	// Receiving data from the channel, as it is a '&lt;-</a:t>
+            </a:r>
+            <a:r>
+              <a:rPr lang="en-US" sz="1200" dirty="0" err="1">
+                <a:solidFill>
+                  <a:srgbClr val="FFFFFF"/>
+                </a:solidFill>
+                <a:latin typeface="Courier New"/>
+              </a:rPr>
+              <a:t>chan</a:t>
+            </a:r>
+            <a:r>
+              <a:rPr lang="en-US" sz="1200" dirty="0">
+                <a:solidFill>
+                  <a:srgbClr val="FFFFFF"/>
+                </a:solidFill>
+                <a:latin typeface="Courier New"/>
+              </a:rPr>
+              <a:t> int' type.</a:t>
+            </a:r>
+          </a:p>
+          <a:p>
+            <a:r>
+              <a:rPr lang="en-US" sz="1200" dirty="0">
+                <a:solidFill>
+                  <a:srgbClr val="FFFFFF"/>
+                </a:solidFill>
+                <a:latin typeface="Courier New"/>
+              </a:rPr>
+              <a:t>	</a:t>
+            </a:r>
+            <a:r>
+              <a:rPr lang="en-US" sz="1200" dirty="0" err="1">
+                <a:solidFill>
+                  <a:srgbClr val="FFFFFF"/>
+                </a:solidFill>
+                <a:latin typeface="Courier New"/>
+              </a:rPr>
+              <a:t>fmt.Println</a:t>
+            </a:r>
+            <a:r>
+              <a:rPr lang="en-US" sz="1200" dirty="0">
+                <a:solidFill>
+                  <a:srgbClr val="FFFFFF"/>
+                </a:solidFill>
+                <a:latin typeface="Courier New"/>
+              </a:rPr>
+              <a:t>(&lt;-</a:t>
+            </a:r>
+            <a:r>
+              <a:rPr lang="en-US" sz="1200" dirty="0" err="1">
+                <a:solidFill>
+                  <a:srgbClr val="FFFFFF"/>
+                </a:solidFill>
+                <a:latin typeface="Courier New"/>
+              </a:rPr>
+              <a:t>ch</a:t>
+            </a:r>
+            <a:r>
+              <a:rPr lang="en-US" sz="1200" dirty="0">
+                <a:solidFill>
+                  <a:srgbClr val="FFFFFF"/>
+                </a:solidFill>
+                <a:latin typeface="Courier New"/>
+              </a:rPr>
+              <a:t>)</a:t>
+            </a:r>
+          </a:p>
+          <a:p>
+            <a:r>
+              <a:rPr lang="en-US" sz="1200" dirty="0">
+                <a:solidFill>
+                  <a:srgbClr val="FFFFFF"/>
+                </a:solidFill>
+                <a:latin typeface="Courier New"/>
+              </a:rPr>
+              <a:t>}</a:t>
+            </a:r>
+          </a:p>
+          <a:p>
+            <a:endParaRPr lang="en-US" sz="1200" dirty="0">
+              <a:solidFill>
+                <a:srgbClr val="FFFFFF"/>
+              </a:solidFill>
+              <a:latin typeface="Courier New"/>
+            </a:endParaRPr>
+          </a:p>
+          <a:p>
+            <a:r>
+              <a:rPr lang="en-US" sz="1200" dirty="0" err="1">
+                <a:solidFill>
+                  <a:srgbClr val="FFFFFF"/>
+                </a:solidFill>
+                <a:latin typeface="Courier New"/>
+              </a:rPr>
+              <a:t>func</a:t>
+            </a:r>
+            <a:r>
+              <a:rPr lang="en-US" sz="1200" dirty="0">
+                <a:solidFill>
+                  <a:srgbClr val="FFFFFF"/>
+                </a:solidFill>
+                <a:latin typeface="Courier New"/>
+              </a:rPr>
+              <a:t> main() {</a:t>
+            </a:r>
+          </a:p>
+          <a:p>
+            <a:r>
+              <a:rPr lang="en-US" sz="1200" dirty="0">
+                <a:solidFill>
+                  <a:srgbClr val="FFFFFF"/>
+                </a:solidFill>
+                <a:latin typeface="Courier New"/>
+              </a:rPr>
+              <a:t>	// Create a channel of type int</a:t>
+            </a:r>
+          </a:p>
+          <a:p>
+            <a:r>
+              <a:rPr lang="en-US" sz="1200" dirty="0">
+                <a:solidFill>
+                  <a:srgbClr val="FFFFFF"/>
+                </a:solidFill>
+                <a:latin typeface="Courier New"/>
+              </a:rPr>
+              <a:t>	</a:t>
+            </a:r>
+            <a:r>
+              <a:rPr lang="en-US" sz="1200" dirty="0" err="1">
+                <a:solidFill>
+                  <a:srgbClr val="FFFFFF"/>
+                </a:solidFill>
+                <a:latin typeface="Courier New"/>
+              </a:rPr>
+              <a:t>ch</a:t>
+            </a:r>
+            <a:r>
+              <a:rPr lang="en-US" sz="1200" dirty="0">
+                <a:solidFill>
+                  <a:srgbClr val="FFFFFF"/>
+                </a:solidFill>
+                <a:latin typeface="Courier New"/>
+              </a:rPr>
               <a:t> := make(</a:t>
             </a:r>
             <a:r>
-              <a:rPr dirty="0" err="1"/>
+              <a:rPr lang="en-US" sz="1200" dirty="0" err="1">
+                <a:solidFill>
+                  <a:srgbClr val="FFFFFF"/>
+                </a:solidFill>
+                <a:latin typeface="Courier New"/>
+              </a:rPr>
               <a:t>chan</a:t>
             </a:r>
             <a:r>
-              <a:rPr dirty="0"/>
+              <a:rPr lang="en-US" sz="1200" dirty="0">
+                <a:solidFill>
+                  <a:srgbClr val="FFFFFF"/>
+                </a:solidFill>
+                <a:latin typeface="Courier New"/>
+              </a:rPr>
               <a:t> int)</a:t>
             </a:r>
-            <a:br>
-              <a:rPr dirty="0"/>
-            </a:br>
-            <a:r>
-              <a:rPr dirty="0"/>
-              <a:t>go </a:t>
-            </a:r>
-            <a:r>
-              <a:rPr dirty="0" err="1"/>
-              <a:t>func</a:t>
-            </a:r>
-            <a:r>
-              <a:rPr dirty="0"/>
-              <a:t>() { </a:t>
-            </a:r>
-            <a:r>
-              <a:rPr dirty="0" err="1"/>
+          </a:p>
+          <a:p>
+            <a:endParaRPr lang="en-US" sz="1200" dirty="0">
+              <a:solidFill>
+                <a:srgbClr val="FFFFFF"/>
+              </a:solidFill>
+              <a:latin typeface="Courier New"/>
+            </a:endParaRPr>
+          </a:p>
+          <a:p>
+            <a:r>
+              <a:rPr lang="en-US" sz="1200" dirty="0">
+                <a:solidFill>
+                  <a:srgbClr val="FFFFFF"/>
+                </a:solidFill>
+                <a:latin typeface="Courier New"/>
+              </a:rPr>
+              <a:t>	// Sending data using the </a:t>
+            </a:r>
+            <a:r>
+              <a:rPr lang="en-US" sz="1200" dirty="0" err="1">
+                <a:solidFill>
+                  <a:srgbClr val="FFFFFF"/>
+                </a:solidFill>
+                <a:latin typeface="Courier New"/>
+              </a:rPr>
+              <a:t>sendData</a:t>
+            </a:r>
+            <a:r>
+              <a:rPr lang="en-US" sz="1200" dirty="0">
+                <a:solidFill>
+                  <a:srgbClr val="FFFFFF"/>
+                </a:solidFill>
+                <a:latin typeface="Courier New"/>
+              </a:rPr>
+              <a:t> function</a:t>
+            </a:r>
+          </a:p>
+          <a:p>
+            <a:r>
+              <a:rPr lang="en-US" sz="1200" dirty="0">
+                <a:solidFill>
+                  <a:srgbClr val="FFFFFF"/>
+                </a:solidFill>
+                <a:latin typeface="Courier New"/>
+              </a:rPr>
+              <a:t>	go </a:t>
+            </a:r>
+            <a:r>
+              <a:rPr lang="en-US" sz="1200" dirty="0" err="1">
+                <a:solidFill>
+                  <a:srgbClr val="FFFFFF"/>
+                </a:solidFill>
+                <a:latin typeface="Courier New"/>
+              </a:rPr>
+              <a:t>sendData</a:t>
+            </a:r>
+            <a:r>
+              <a:rPr lang="en-US" sz="1200" dirty="0">
+                <a:solidFill>
+                  <a:srgbClr val="FFFFFF"/>
+                </a:solidFill>
+                <a:latin typeface="Courier New"/>
+              </a:rPr>
+              <a:t>(</a:t>
+            </a:r>
+            <a:r>
+              <a:rPr lang="en-US" sz="1200" dirty="0" err="1">
+                <a:solidFill>
+                  <a:srgbClr val="FFFFFF"/>
+                </a:solidFill>
+                <a:latin typeface="Courier New"/>
+              </a:rPr>
               <a:t>ch</a:t>
             </a:r>
             <a:r>
-              <a:rPr dirty="0"/>
-              <a:t> &lt;- 42 }()</a:t>
-            </a:r>
-            <a:br>
-              <a:rPr dirty="0"/>
-            </a:br>
-            <a:r>
-              <a:rPr dirty="0" err="1"/>
-              <a:t>fmt.Println</a:t>
-            </a:r>
-            <a:r>
-              <a:rPr dirty="0"/>
-              <a:t>(&lt;-</a:t>
-            </a:r>
-            <a:r>
-              <a:rPr dirty="0" err="1"/>
+              <a:rPr lang="en-US" sz="1200" dirty="0">
+                <a:solidFill>
+                  <a:srgbClr val="FFFFFF"/>
+                </a:solidFill>
+                <a:latin typeface="Courier New"/>
+              </a:rPr>
+              <a:t>)</a:t>
+            </a:r>
+          </a:p>
+          <a:p>
+            <a:endParaRPr lang="en-US" sz="1200" dirty="0">
+              <a:solidFill>
+                <a:srgbClr val="FFFFFF"/>
+              </a:solidFill>
+              <a:latin typeface="Courier New"/>
+            </a:endParaRPr>
+          </a:p>
+          <a:p>
+            <a:r>
+              <a:rPr lang="en-US" sz="1200" dirty="0">
+                <a:solidFill>
+                  <a:srgbClr val="FFFFFF"/>
+                </a:solidFill>
+                <a:latin typeface="Courier New"/>
+              </a:rPr>
+              <a:t>	// Receiving data using the </a:t>
+            </a:r>
+            <a:r>
+              <a:rPr lang="en-US" sz="1200" dirty="0" err="1">
+                <a:solidFill>
+                  <a:srgbClr val="FFFFFF"/>
+                </a:solidFill>
+                <a:latin typeface="Courier New"/>
+              </a:rPr>
+              <a:t>receiveData</a:t>
+            </a:r>
+            <a:r>
+              <a:rPr lang="en-US" sz="1200" dirty="0">
+                <a:solidFill>
+                  <a:srgbClr val="FFFFFF"/>
+                </a:solidFill>
+                <a:latin typeface="Courier New"/>
+              </a:rPr>
+              <a:t> function</a:t>
+            </a:r>
+          </a:p>
+          <a:p>
+            <a:r>
+              <a:rPr lang="en-US" sz="1200" dirty="0">
+                <a:solidFill>
+                  <a:srgbClr val="FFFFFF"/>
+                </a:solidFill>
+                <a:latin typeface="Courier New"/>
+              </a:rPr>
+              <a:t>	</a:t>
+            </a:r>
+            <a:r>
+              <a:rPr lang="en-US" sz="1200" dirty="0" err="1">
+                <a:solidFill>
+                  <a:srgbClr val="FFFFFF"/>
+                </a:solidFill>
+                <a:latin typeface="Courier New"/>
+              </a:rPr>
+              <a:t>receiveData</a:t>
+            </a:r>
+            <a:r>
+              <a:rPr lang="en-US" sz="1200" dirty="0">
+                <a:solidFill>
+                  <a:srgbClr val="FFFFFF"/>
+                </a:solidFill>
+                <a:latin typeface="Courier New"/>
+              </a:rPr>
+              <a:t>(</a:t>
+            </a:r>
+            <a:r>
+              <a:rPr lang="en-US" sz="1200" dirty="0" err="1">
+                <a:solidFill>
+                  <a:srgbClr val="FFFFFF"/>
+                </a:solidFill>
+                <a:latin typeface="Courier New"/>
+              </a:rPr>
               <a:t>ch</a:t>
             </a:r>
             <a:r>
-              <a:rPr dirty="0"/>
+              <a:rPr lang="en-US" sz="1200" dirty="0">
+                <a:solidFill>
+                  <a:srgbClr val="FFFFFF"/>
+                </a:solidFill>
+                <a:latin typeface="Courier New"/>
+              </a:rPr>
               <a:t>)</a:t>
             </a:r>
-            <a:br>
-              <a:rPr dirty="0"/>
-            </a:br>
-            <a:br>
-              <a:rPr dirty="0"/>
-            </a:br>
-            <a:endParaRPr dirty="0"/>
+          </a:p>
+          <a:p>
+            <a:r>
+              <a:rPr lang="en-US" sz="1200" dirty="0">
+                <a:solidFill>
+                  <a:srgbClr val="FFFFFF"/>
+                </a:solidFill>
+                <a:latin typeface="Courier New"/>
+              </a:rPr>
+              <a:t>}</a:t>
+            </a:r>
+            <a:endParaRPr sz="1200" dirty="0">
+              <a:solidFill>
+                <a:srgbClr val="FFFFFF"/>
+              </a:solidFill>
+              <a:latin typeface="Courier New"/>
+            </a:endParaRPr>
           </a:p>
         </p:txBody>
       </p:sp>

</xml_diff>